<commit_message>
finalização documentação iteração 2
</commit_message>
<xml_diff>
--- a/Projeto-AjudeMais/002-Acompanhamento/Iteracao-02/ADR - apresentacao de resultados-IT02.pptx
+++ b/Projeto-AjudeMais/002-Acompanhamento/Iteracao-02/ADR - apresentacao de resultados-IT02.pptx
@@ -20,11 +20,11 @@
     <p:sldId id="267" r:id="rId15"/>
     <p:sldId id="268" r:id="rId16"/>
     <p:sldId id="269" r:id="rId17"/>
-    <p:sldId id="271" r:id="rId18"/>
-    <p:sldId id="272" r:id="rId19"/>
+    <p:sldId id="270" r:id="rId18"/>
+    <p:sldId id="271" r:id="rId19"/>
   </p:sldIdLst>
   <p:sldSz cx="9144000" cy="6858000"/>
-  <p:notesSz cx="7772400" cy="10058400"/>
+  <p:notesSz cx="7559675" cy="10691495"/>
   <p:defaultTextStyle>
     <a:lvl1pPr marL="0" algn="l" defTabSz="914400" rtl="0" eaLnBrk="1" latinLnBrk="0" hangingPunct="1">
       <a:defRPr sz="1800" kern="1200">
@@ -184,8 +184,7 @@
         <p:txBody>
           <a:bodyPr lIns="0" tIns="0" rIns="0" bIns="0" anchor="ctr"/>
           <a:p>
-            <a:pPr algn="ctr"/>
-            <a:endParaRPr lang="pt-BR" sz="4400" b="0" strike="noStrike" spc="-1">
+            <a:endParaRPr lang="pt-BR" sz="1800" b="0" strike="noStrike" spc="-1">
               <a:solidFill>
                 <a:srgbClr val="000000"/>
               </a:solidFill>
@@ -221,7 +220,7 @@
         <p:txBody>
           <a:bodyPr lIns="0" tIns="0" rIns="0" bIns="0"/>
           <a:p>
-            <a:endParaRPr lang="pt-BR" sz="3200" b="0" strike="noStrike" spc="-1">
+            <a:endParaRPr lang="pt-BR" sz="1800" b="0" strike="noStrike" spc="-1">
               <a:solidFill>
                 <a:srgbClr val="000000"/>
               </a:solidFill>
@@ -257,7 +256,7 @@
         <p:txBody>
           <a:bodyPr lIns="0" tIns="0" rIns="0" bIns="0"/>
           <a:p>
-            <a:endParaRPr lang="pt-BR" sz="3200" b="0" strike="noStrike" spc="-1">
+            <a:endParaRPr lang="pt-BR" sz="1800" b="0" strike="noStrike" spc="-1">
               <a:solidFill>
                 <a:srgbClr val="000000"/>
               </a:solidFill>
@@ -318,8 +317,7 @@
         <p:txBody>
           <a:bodyPr lIns="0" tIns="0" rIns="0" bIns="0" anchor="ctr"/>
           <a:p>
-            <a:pPr algn="ctr"/>
-            <a:endParaRPr lang="pt-BR" sz="4400" b="0" strike="noStrike" spc="-1">
+            <a:endParaRPr lang="pt-BR" sz="1800" b="0" strike="noStrike" spc="-1">
               <a:solidFill>
                 <a:srgbClr val="000000"/>
               </a:solidFill>
@@ -355,7 +353,7 @@
         <p:txBody>
           <a:bodyPr lIns="0" tIns="0" rIns="0" bIns="0"/>
           <a:p>
-            <a:endParaRPr lang="pt-BR" sz="3200" b="0" strike="noStrike" spc="-1">
+            <a:endParaRPr lang="pt-BR" sz="1800" b="0" strike="noStrike" spc="-1">
               <a:solidFill>
                 <a:srgbClr val="000000"/>
               </a:solidFill>
@@ -391,7 +389,7 @@
         <p:txBody>
           <a:bodyPr lIns="0" tIns="0" rIns="0" bIns="0"/>
           <a:p>
-            <a:endParaRPr lang="pt-BR" sz="3200" b="0" strike="noStrike" spc="-1">
+            <a:endParaRPr lang="pt-BR" sz="1800" b="0" strike="noStrike" spc="-1">
               <a:solidFill>
                 <a:srgbClr val="000000"/>
               </a:solidFill>
@@ -427,7 +425,7 @@
         <p:txBody>
           <a:bodyPr lIns="0" tIns="0" rIns="0" bIns="0"/>
           <a:p>
-            <a:endParaRPr lang="pt-BR" sz="3200" b="0" strike="noStrike" spc="-1">
+            <a:endParaRPr lang="pt-BR" sz="1800" b="0" strike="noStrike" spc="-1">
               <a:solidFill>
                 <a:srgbClr val="000000"/>
               </a:solidFill>
@@ -463,7 +461,7 @@
         <p:txBody>
           <a:bodyPr lIns="0" tIns="0" rIns="0" bIns="0"/>
           <a:p>
-            <a:endParaRPr lang="pt-BR" sz="3200" b="0" strike="noStrike" spc="-1">
+            <a:endParaRPr lang="pt-BR" sz="1800" b="0" strike="noStrike" spc="-1">
               <a:solidFill>
                 <a:srgbClr val="000000"/>
               </a:solidFill>
@@ -524,8 +522,7 @@
         <p:txBody>
           <a:bodyPr lIns="0" tIns="0" rIns="0" bIns="0" anchor="ctr"/>
           <a:p>
-            <a:pPr algn="ctr"/>
-            <a:endParaRPr lang="pt-BR" sz="4400" b="0" strike="noStrike" spc="-1">
+            <a:endParaRPr lang="pt-BR" sz="1800" b="0" strike="noStrike" spc="-1">
               <a:solidFill>
                 <a:srgbClr val="000000"/>
               </a:solidFill>
@@ -561,7 +558,7 @@
         <p:txBody>
           <a:bodyPr lIns="0" tIns="0" rIns="0" bIns="0"/>
           <a:p>
-            <a:endParaRPr lang="pt-BR" sz="3200" b="0" strike="noStrike" spc="-1">
+            <a:endParaRPr lang="pt-BR" sz="1800" b="0" strike="noStrike" spc="-1">
               <a:solidFill>
                 <a:srgbClr val="000000"/>
               </a:solidFill>
@@ -597,7 +594,7 @@
         <p:txBody>
           <a:bodyPr lIns="0" tIns="0" rIns="0" bIns="0"/>
           <a:p>
-            <a:endParaRPr lang="pt-BR" sz="3200" b="0" strike="noStrike" spc="-1">
+            <a:endParaRPr lang="pt-BR" sz="1800" b="0" strike="noStrike" spc="-1">
               <a:solidFill>
                 <a:srgbClr val="000000"/>
               </a:solidFill>
@@ -733,8 +730,7 @@
         <p:txBody>
           <a:bodyPr lIns="0" tIns="0" rIns="0" bIns="0" anchor="ctr"/>
           <a:p>
-            <a:pPr algn="ctr"/>
-            <a:endParaRPr lang="pt-BR" sz="4400" b="0" strike="noStrike" spc="-1">
+            <a:endParaRPr lang="pt-BR" sz="1800" b="0" strike="noStrike" spc="-1">
               <a:solidFill>
                 <a:srgbClr val="000000"/>
               </a:solidFill>
@@ -832,8 +828,7 @@
         <p:txBody>
           <a:bodyPr lIns="0" tIns="0" rIns="0" bIns="0" anchor="ctr"/>
           <a:p>
-            <a:pPr algn="ctr"/>
-            <a:endParaRPr lang="pt-BR" sz="4400" b="0" strike="noStrike" spc="-1">
+            <a:endParaRPr lang="pt-BR" sz="1800" b="0" strike="noStrike" spc="-1">
               <a:solidFill>
                 <a:srgbClr val="000000"/>
               </a:solidFill>
@@ -869,7 +864,7 @@
         <p:txBody>
           <a:bodyPr lIns="0" tIns="0" rIns="0" bIns="0"/>
           <a:p>
-            <a:endParaRPr lang="pt-BR" sz="3200" b="0" strike="noStrike" spc="-1">
+            <a:endParaRPr lang="pt-BR" sz="1800" b="0" strike="noStrike" spc="-1">
               <a:solidFill>
                 <a:srgbClr val="000000"/>
               </a:solidFill>
@@ -930,8 +925,7 @@
         <p:txBody>
           <a:bodyPr lIns="0" tIns="0" rIns="0" bIns="0" anchor="ctr"/>
           <a:p>
-            <a:pPr algn="ctr"/>
-            <a:endParaRPr lang="pt-BR" sz="4400" b="0" strike="noStrike" spc="-1">
+            <a:endParaRPr lang="pt-BR" sz="1800" b="0" strike="noStrike" spc="-1">
               <a:solidFill>
                 <a:srgbClr val="000000"/>
               </a:solidFill>
@@ -967,7 +961,7 @@
         <p:txBody>
           <a:bodyPr lIns="0" tIns="0" rIns="0" bIns="0"/>
           <a:p>
-            <a:endParaRPr lang="pt-BR" sz="3200" b="0" strike="noStrike" spc="-1">
+            <a:endParaRPr lang="pt-BR" sz="1800" b="0" strike="noStrike" spc="-1">
               <a:solidFill>
                 <a:srgbClr val="000000"/>
               </a:solidFill>
@@ -1003,7 +997,7 @@
         <p:txBody>
           <a:bodyPr lIns="0" tIns="0" rIns="0" bIns="0"/>
           <a:p>
-            <a:endParaRPr lang="pt-BR" sz="3200" b="0" strike="noStrike" spc="-1">
+            <a:endParaRPr lang="pt-BR" sz="1800" b="0" strike="noStrike" spc="-1">
               <a:solidFill>
                 <a:srgbClr val="000000"/>
               </a:solidFill>
@@ -1064,8 +1058,7 @@
         <p:txBody>
           <a:bodyPr lIns="0" tIns="0" rIns="0" bIns="0" anchor="ctr"/>
           <a:p>
-            <a:pPr algn="ctr"/>
-            <a:endParaRPr lang="pt-BR" sz="4400" b="0" strike="noStrike" spc="-1">
+            <a:endParaRPr lang="pt-BR" sz="1800" b="0" strike="noStrike" spc="-1">
               <a:solidFill>
                 <a:srgbClr val="000000"/>
               </a:solidFill>
@@ -1188,8 +1181,7 @@
         <p:txBody>
           <a:bodyPr lIns="0" tIns="0" rIns="0" bIns="0" anchor="ctr"/>
           <a:p>
-            <a:pPr algn="ctr"/>
-            <a:endParaRPr lang="pt-BR" sz="4400" b="0" strike="noStrike" spc="-1">
+            <a:endParaRPr lang="pt-BR" sz="1800" b="0" strike="noStrike" spc="-1">
               <a:solidFill>
                 <a:srgbClr val="000000"/>
               </a:solidFill>
@@ -1225,7 +1217,7 @@
         <p:txBody>
           <a:bodyPr lIns="0" tIns="0" rIns="0" bIns="0"/>
           <a:p>
-            <a:endParaRPr lang="pt-BR" sz="3200" b="0" strike="noStrike" spc="-1">
+            <a:endParaRPr lang="pt-BR" sz="1800" b="0" strike="noStrike" spc="-1">
               <a:solidFill>
                 <a:srgbClr val="000000"/>
               </a:solidFill>
@@ -1261,7 +1253,7 @@
         <p:txBody>
           <a:bodyPr lIns="0" tIns="0" rIns="0" bIns="0"/>
           <a:p>
-            <a:endParaRPr lang="pt-BR" sz="3200" b="0" strike="noStrike" spc="-1">
+            <a:endParaRPr lang="pt-BR" sz="1800" b="0" strike="noStrike" spc="-1">
               <a:solidFill>
                 <a:srgbClr val="000000"/>
               </a:solidFill>
@@ -1297,7 +1289,7 @@
         <p:txBody>
           <a:bodyPr lIns="0" tIns="0" rIns="0" bIns="0"/>
           <a:p>
-            <a:endParaRPr lang="pt-BR" sz="3200" b="0" strike="noStrike" spc="-1">
+            <a:endParaRPr lang="pt-BR" sz="1800" b="0" strike="noStrike" spc="-1">
               <a:solidFill>
                 <a:srgbClr val="000000"/>
               </a:solidFill>
@@ -1358,8 +1350,7 @@
         <p:txBody>
           <a:bodyPr lIns="0" tIns="0" rIns="0" bIns="0" anchor="ctr"/>
           <a:p>
-            <a:pPr algn="ctr"/>
-            <a:endParaRPr lang="pt-BR" sz="4400" b="0" strike="noStrike" spc="-1">
+            <a:endParaRPr lang="pt-BR" sz="1800" b="0" strike="noStrike" spc="-1">
               <a:solidFill>
                 <a:srgbClr val="000000"/>
               </a:solidFill>
@@ -1457,8 +1448,7 @@
         <p:txBody>
           <a:bodyPr lIns="0" tIns="0" rIns="0" bIns="0" anchor="ctr"/>
           <a:p>
-            <a:pPr algn="ctr"/>
-            <a:endParaRPr lang="pt-BR" sz="4400" b="0" strike="noStrike" spc="-1">
+            <a:endParaRPr lang="pt-BR" sz="1800" b="0" strike="noStrike" spc="-1">
               <a:solidFill>
                 <a:srgbClr val="000000"/>
               </a:solidFill>
@@ -1494,7 +1484,7 @@
         <p:txBody>
           <a:bodyPr lIns="0" tIns="0" rIns="0" bIns="0"/>
           <a:p>
-            <a:endParaRPr lang="pt-BR" sz="3200" b="0" strike="noStrike" spc="-1">
+            <a:endParaRPr lang="pt-BR" sz="1800" b="0" strike="noStrike" spc="-1">
               <a:solidFill>
                 <a:srgbClr val="000000"/>
               </a:solidFill>
@@ -1530,7 +1520,7 @@
         <p:txBody>
           <a:bodyPr lIns="0" tIns="0" rIns="0" bIns="0"/>
           <a:p>
-            <a:endParaRPr lang="pt-BR" sz="3200" b="0" strike="noStrike" spc="-1">
+            <a:endParaRPr lang="pt-BR" sz="1800" b="0" strike="noStrike" spc="-1">
               <a:solidFill>
                 <a:srgbClr val="000000"/>
               </a:solidFill>
@@ -1566,7 +1556,7 @@
         <p:txBody>
           <a:bodyPr lIns="0" tIns="0" rIns="0" bIns="0"/>
           <a:p>
-            <a:endParaRPr lang="pt-BR" sz="3200" b="0" strike="noStrike" spc="-1">
+            <a:endParaRPr lang="pt-BR" sz="1800" b="0" strike="noStrike" spc="-1">
               <a:solidFill>
                 <a:srgbClr val="000000"/>
               </a:solidFill>
@@ -1627,8 +1617,7 @@
         <p:txBody>
           <a:bodyPr lIns="0" tIns="0" rIns="0" bIns="0" anchor="ctr"/>
           <a:p>
-            <a:pPr algn="ctr"/>
-            <a:endParaRPr lang="pt-BR" sz="4400" b="0" strike="noStrike" spc="-1">
+            <a:endParaRPr lang="pt-BR" sz="1800" b="0" strike="noStrike" spc="-1">
               <a:solidFill>
                 <a:srgbClr val="000000"/>
               </a:solidFill>
@@ -1664,7 +1653,7 @@
         <p:txBody>
           <a:bodyPr lIns="0" tIns="0" rIns="0" bIns="0"/>
           <a:p>
-            <a:endParaRPr lang="pt-BR" sz="3200" b="0" strike="noStrike" spc="-1">
+            <a:endParaRPr lang="pt-BR" sz="1800" b="0" strike="noStrike" spc="-1">
               <a:solidFill>
                 <a:srgbClr val="000000"/>
               </a:solidFill>
@@ -1700,7 +1689,7 @@
         <p:txBody>
           <a:bodyPr lIns="0" tIns="0" rIns="0" bIns="0"/>
           <a:p>
-            <a:endParaRPr lang="pt-BR" sz="3200" b="0" strike="noStrike" spc="-1">
+            <a:endParaRPr lang="pt-BR" sz="1800" b="0" strike="noStrike" spc="-1">
               <a:solidFill>
                 <a:srgbClr val="000000"/>
               </a:solidFill>
@@ -1736,7 +1725,7 @@
         <p:txBody>
           <a:bodyPr lIns="0" tIns="0" rIns="0" bIns="0"/>
           <a:p>
-            <a:endParaRPr lang="pt-BR" sz="3200" b="0" strike="noStrike" spc="-1">
+            <a:endParaRPr lang="pt-BR" sz="1800" b="0" strike="noStrike" spc="-1">
               <a:solidFill>
                 <a:srgbClr val="000000"/>
               </a:solidFill>
@@ -1797,8 +1786,7 @@
         <p:txBody>
           <a:bodyPr lIns="0" tIns="0" rIns="0" bIns="0" anchor="ctr"/>
           <a:p>
-            <a:pPr algn="ctr"/>
-            <a:endParaRPr lang="pt-BR" sz="4400" b="0" strike="noStrike" spc="-1">
+            <a:endParaRPr lang="pt-BR" sz="1800" b="0" strike="noStrike" spc="-1">
               <a:solidFill>
                 <a:srgbClr val="000000"/>
               </a:solidFill>
@@ -1834,7 +1822,7 @@
         <p:txBody>
           <a:bodyPr lIns="0" tIns="0" rIns="0" bIns="0"/>
           <a:p>
-            <a:endParaRPr lang="pt-BR" sz="3200" b="0" strike="noStrike" spc="-1">
+            <a:endParaRPr lang="pt-BR" sz="1800" b="0" strike="noStrike" spc="-1">
               <a:solidFill>
                 <a:srgbClr val="000000"/>
               </a:solidFill>
@@ -1870,7 +1858,7 @@
         <p:txBody>
           <a:bodyPr lIns="0" tIns="0" rIns="0" bIns="0"/>
           <a:p>
-            <a:endParaRPr lang="pt-BR" sz="3200" b="0" strike="noStrike" spc="-1">
+            <a:endParaRPr lang="pt-BR" sz="1800" b="0" strike="noStrike" spc="-1">
               <a:solidFill>
                 <a:srgbClr val="000000"/>
               </a:solidFill>
@@ -1931,8 +1919,7 @@
         <p:txBody>
           <a:bodyPr lIns="0" tIns="0" rIns="0" bIns="0" anchor="ctr"/>
           <a:p>
-            <a:pPr algn="ctr"/>
-            <a:endParaRPr lang="pt-BR" sz="4400" b="0" strike="noStrike" spc="-1">
+            <a:endParaRPr lang="pt-BR" sz="1800" b="0" strike="noStrike" spc="-1">
               <a:solidFill>
                 <a:srgbClr val="000000"/>
               </a:solidFill>
@@ -1968,7 +1955,7 @@
         <p:txBody>
           <a:bodyPr lIns="0" tIns="0" rIns="0" bIns="0"/>
           <a:p>
-            <a:endParaRPr lang="pt-BR" sz="3200" b="0" strike="noStrike" spc="-1">
+            <a:endParaRPr lang="pt-BR" sz="1800" b="0" strike="noStrike" spc="-1">
               <a:solidFill>
                 <a:srgbClr val="000000"/>
               </a:solidFill>
@@ -2004,7 +1991,7 @@
         <p:txBody>
           <a:bodyPr lIns="0" tIns="0" rIns="0" bIns="0"/>
           <a:p>
-            <a:endParaRPr lang="pt-BR" sz="3200" b="0" strike="noStrike" spc="-1">
+            <a:endParaRPr lang="pt-BR" sz="1800" b="0" strike="noStrike" spc="-1">
               <a:solidFill>
                 <a:srgbClr val="000000"/>
               </a:solidFill>
@@ -2040,7 +2027,7 @@
         <p:txBody>
           <a:bodyPr lIns="0" tIns="0" rIns="0" bIns="0"/>
           <a:p>
-            <a:endParaRPr lang="pt-BR" sz="3200" b="0" strike="noStrike" spc="-1">
+            <a:endParaRPr lang="pt-BR" sz="1800" b="0" strike="noStrike" spc="-1">
               <a:solidFill>
                 <a:srgbClr val="000000"/>
               </a:solidFill>
@@ -2076,7 +2063,7 @@
         <p:txBody>
           <a:bodyPr lIns="0" tIns="0" rIns="0" bIns="0"/>
           <a:p>
-            <a:endParaRPr lang="pt-BR" sz="3200" b="0" strike="noStrike" spc="-1">
+            <a:endParaRPr lang="pt-BR" sz="1800" b="0" strike="noStrike" spc="-1">
               <a:solidFill>
                 <a:srgbClr val="000000"/>
               </a:solidFill>
@@ -2137,8 +2124,7 @@
         <p:txBody>
           <a:bodyPr lIns="0" tIns="0" rIns="0" bIns="0" anchor="ctr"/>
           <a:p>
-            <a:pPr algn="ctr"/>
-            <a:endParaRPr lang="pt-BR" sz="4400" b="0" strike="noStrike" spc="-1">
+            <a:endParaRPr lang="pt-BR" sz="1800" b="0" strike="noStrike" spc="-1">
               <a:solidFill>
                 <a:srgbClr val="000000"/>
               </a:solidFill>
@@ -2174,7 +2160,7 @@
         <p:txBody>
           <a:bodyPr lIns="0" tIns="0" rIns="0" bIns="0"/>
           <a:p>
-            <a:endParaRPr lang="pt-BR" sz="3200" b="0" strike="noStrike" spc="-1">
+            <a:endParaRPr lang="pt-BR" sz="1800" b="0" strike="noStrike" spc="-1">
               <a:solidFill>
                 <a:srgbClr val="000000"/>
               </a:solidFill>
@@ -2210,7 +2196,7 @@
         <p:txBody>
           <a:bodyPr lIns="0" tIns="0" rIns="0" bIns="0"/>
           <a:p>
-            <a:endParaRPr lang="pt-BR" sz="3200" b="0" strike="noStrike" spc="-1">
+            <a:endParaRPr lang="pt-BR" sz="1800" b="0" strike="noStrike" spc="-1">
               <a:solidFill>
                 <a:srgbClr val="000000"/>
               </a:solidFill>
@@ -2321,8 +2307,7 @@
         <p:txBody>
           <a:bodyPr lIns="0" tIns="0" rIns="0" bIns="0" anchor="ctr"/>
           <a:p>
-            <a:pPr algn="ctr"/>
-            <a:endParaRPr lang="pt-BR" sz="4400" b="0" strike="noStrike" spc="-1">
+            <a:endParaRPr lang="pt-BR" sz="1800" b="0" strike="noStrike" spc="-1">
               <a:solidFill>
                 <a:srgbClr val="000000"/>
               </a:solidFill>
@@ -2358,7 +2343,7 @@
         <p:txBody>
           <a:bodyPr lIns="0" tIns="0" rIns="0" bIns="0"/>
           <a:p>
-            <a:endParaRPr lang="pt-BR" sz="3200" b="0" strike="noStrike" spc="-1">
+            <a:endParaRPr lang="pt-BR" sz="1800" b="0" strike="noStrike" spc="-1">
               <a:solidFill>
                 <a:srgbClr val="000000"/>
               </a:solidFill>
@@ -2419,8 +2404,7 @@
         <p:txBody>
           <a:bodyPr lIns="0" tIns="0" rIns="0" bIns="0" anchor="ctr"/>
           <a:p>
-            <a:pPr algn="ctr"/>
-            <a:endParaRPr lang="pt-BR" sz="4400" b="0" strike="noStrike" spc="-1">
+            <a:endParaRPr lang="pt-BR" sz="1800" b="0" strike="noStrike" spc="-1">
               <a:solidFill>
                 <a:srgbClr val="000000"/>
               </a:solidFill>
@@ -2456,7 +2440,7 @@
         <p:txBody>
           <a:bodyPr lIns="0" tIns="0" rIns="0" bIns="0"/>
           <a:p>
-            <a:endParaRPr lang="pt-BR" sz="3200" b="0" strike="noStrike" spc="-1">
+            <a:endParaRPr lang="pt-BR" sz="1800" b="0" strike="noStrike" spc="-1">
               <a:solidFill>
                 <a:srgbClr val="000000"/>
               </a:solidFill>
@@ -2492,7 +2476,7 @@
         <p:txBody>
           <a:bodyPr lIns="0" tIns="0" rIns="0" bIns="0"/>
           <a:p>
-            <a:endParaRPr lang="pt-BR" sz="3200" b="0" strike="noStrike" spc="-1">
+            <a:endParaRPr lang="pt-BR" sz="1800" b="0" strike="noStrike" spc="-1">
               <a:solidFill>
                 <a:srgbClr val="000000"/>
               </a:solidFill>
@@ -2553,8 +2537,7 @@
         <p:txBody>
           <a:bodyPr lIns="0" tIns="0" rIns="0" bIns="0" anchor="ctr"/>
           <a:p>
-            <a:pPr algn="ctr"/>
-            <a:endParaRPr lang="pt-BR" sz="4400" b="0" strike="noStrike" spc="-1">
+            <a:endParaRPr lang="pt-BR" sz="1800" b="0" strike="noStrike" spc="-1">
               <a:solidFill>
                 <a:srgbClr val="000000"/>
               </a:solidFill>
@@ -2677,8 +2660,7 @@
         <p:txBody>
           <a:bodyPr lIns="0" tIns="0" rIns="0" bIns="0" anchor="ctr"/>
           <a:p>
-            <a:pPr algn="ctr"/>
-            <a:endParaRPr lang="pt-BR" sz="4400" b="0" strike="noStrike" spc="-1">
+            <a:endParaRPr lang="pt-BR" sz="1800" b="0" strike="noStrike" spc="-1">
               <a:solidFill>
                 <a:srgbClr val="000000"/>
               </a:solidFill>
@@ -2714,7 +2696,7 @@
         <p:txBody>
           <a:bodyPr lIns="0" tIns="0" rIns="0" bIns="0"/>
           <a:p>
-            <a:endParaRPr lang="pt-BR" sz="3200" b="0" strike="noStrike" spc="-1">
+            <a:endParaRPr lang="pt-BR" sz="1800" b="0" strike="noStrike" spc="-1">
               <a:solidFill>
                 <a:srgbClr val="000000"/>
               </a:solidFill>
@@ -2750,7 +2732,7 @@
         <p:txBody>
           <a:bodyPr lIns="0" tIns="0" rIns="0" bIns="0"/>
           <a:p>
-            <a:endParaRPr lang="pt-BR" sz="3200" b="0" strike="noStrike" spc="-1">
+            <a:endParaRPr lang="pt-BR" sz="1800" b="0" strike="noStrike" spc="-1">
               <a:solidFill>
                 <a:srgbClr val="000000"/>
               </a:solidFill>
@@ -2786,7 +2768,7 @@
         <p:txBody>
           <a:bodyPr lIns="0" tIns="0" rIns="0" bIns="0"/>
           <a:p>
-            <a:endParaRPr lang="pt-BR" sz="3200" b="0" strike="noStrike" spc="-1">
+            <a:endParaRPr lang="pt-BR" sz="1800" b="0" strike="noStrike" spc="-1">
               <a:solidFill>
                 <a:srgbClr val="000000"/>
               </a:solidFill>
@@ -2847,8 +2829,7 @@
         <p:txBody>
           <a:bodyPr lIns="0" tIns="0" rIns="0" bIns="0" anchor="ctr"/>
           <a:p>
-            <a:pPr algn="ctr"/>
-            <a:endParaRPr lang="pt-BR" sz="4400" b="0" strike="noStrike" spc="-1">
+            <a:endParaRPr lang="pt-BR" sz="1800" b="0" strike="noStrike" spc="-1">
               <a:solidFill>
                 <a:srgbClr val="000000"/>
               </a:solidFill>
@@ -2884,7 +2865,7 @@
         <p:txBody>
           <a:bodyPr lIns="0" tIns="0" rIns="0" bIns="0"/>
           <a:p>
-            <a:endParaRPr lang="pt-BR" sz="3200" b="0" strike="noStrike" spc="-1">
+            <a:endParaRPr lang="pt-BR" sz="1800" b="0" strike="noStrike" spc="-1">
               <a:solidFill>
                 <a:srgbClr val="000000"/>
               </a:solidFill>
@@ -2920,7 +2901,7 @@
         <p:txBody>
           <a:bodyPr lIns="0" tIns="0" rIns="0" bIns="0"/>
           <a:p>
-            <a:endParaRPr lang="pt-BR" sz="3200" b="0" strike="noStrike" spc="-1">
+            <a:endParaRPr lang="pt-BR" sz="1800" b="0" strike="noStrike" spc="-1">
               <a:solidFill>
                 <a:srgbClr val="000000"/>
               </a:solidFill>
@@ -2956,7 +2937,7 @@
         <p:txBody>
           <a:bodyPr lIns="0" tIns="0" rIns="0" bIns="0"/>
           <a:p>
-            <a:endParaRPr lang="pt-BR" sz="3200" b="0" strike="noStrike" spc="-1">
+            <a:endParaRPr lang="pt-BR" sz="1800" b="0" strike="noStrike" spc="-1">
               <a:solidFill>
                 <a:srgbClr val="000000"/>
               </a:solidFill>
@@ -3017,8 +2998,7 @@
         <p:txBody>
           <a:bodyPr lIns="0" tIns="0" rIns="0" bIns="0" anchor="ctr"/>
           <a:p>
-            <a:pPr algn="ctr"/>
-            <a:endParaRPr lang="pt-BR" sz="4400" b="0" strike="noStrike" spc="-1">
+            <a:endParaRPr lang="pt-BR" sz="1800" b="0" strike="noStrike" spc="-1">
               <a:solidFill>
                 <a:srgbClr val="000000"/>
               </a:solidFill>
@@ -3054,7 +3034,7 @@
         <p:txBody>
           <a:bodyPr lIns="0" tIns="0" rIns="0" bIns="0"/>
           <a:p>
-            <a:endParaRPr lang="pt-BR" sz="3200" b="0" strike="noStrike" spc="-1">
+            <a:endParaRPr lang="pt-BR" sz="1800" b="0" strike="noStrike" spc="-1">
               <a:solidFill>
                 <a:srgbClr val="000000"/>
               </a:solidFill>
@@ -3090,7 +3070,7 @@
         <p:txBody>
           <a:bodyPr lIns="0" tIns="0" rIns="0" bIns="0"/>
           <a:p>
-            <a:endParaRPr lang="pt-BR" sz="3200" b="0" strike="noStrike" spc="-1">
+            <a:endParaRPr lang="pt-BR" sz="1800" b="0" strike="noStrike" spc="-1">
               <a:solidFill>
                 <a:srgbClr val="000000"/>
               </a:solidFill>
@@ -3126,7 +3106,7 @@
         <p:txBody>
           <a:bodyPr lIns="0" tIns="0" rIns="0" bIns="0"/>
           <a:p>
-            <a:endParaRPr lang="pt-BR" sz="3200" b="0" strike="noStrike" spc="-1">
+            <a:endParaRPr lang="pt-BR" sz="1800" b="0" strike="noStrike" spc="-1">
               <a:solidFill>
                 <a:srgbClr val="000000"/>
               </a:solidFill>
@@ -3195,9 +3175,8 @@
         <p:txBody>
           <a:bodyPr lIns="0" tIns="0" rIns="0" bIns="0" anchor="ctr"/>
           <a:p>
-            <a:pPr algn="ctr"/>
             <a:r>
-              <a:rPr lang="pt-BR" sz="4400" b="0" strike="noStrike" spc="-1">
+              <a:rPr lang="pt-BR" sz="1800" b="0" strike="noStrike" spc="-1">
                 <a:solidFill>
                   <a:srgbClr val="000000"/>
                 </a:solidFill>
@@ -3208,9 +3187,9 @@
                 </a:uFill>
                 <a:latin typeface="Arial" charset="0"/>
               </a:rPr>
-              <a:t>Clique para editar o formato do texto do título</a:t>
+              <a:t>Click to edit the title text format</a:t>
             </a:r>
-            <a:endParaRPr lang="pt-BR" sz="4400" b="0" strike="noStrike" spc="-1">
+            <a:endParaRPr lang="pt-BR" sz="1800" b="0" strike="noStrike" spc="-1">
               <a:solidFill>
                 <a:srgbClr val="000000"/>
               </a:solidFill>
@@ -3255,7 +3234,7 @@
               <a:buChar char=""/>
             </a:pPr>
             <a:r>
-              <a:rPr lang="pt-BR" sz="3200" b="0" strike="noStrike" spc="-1">
+              <a:rPr lang="pt-BR" sz="1800" b="0" strike="noStrike" spc="-1">
                 <a:solidFill>
                   <a:srgbClr val="000000"/>
                 </a:solidFill>
@@ -3266,9 +3245,9 @@
                 </a:uFill>
                 <a:latin typeface="Arial" charset="0"/>
               </a:rPr>
-              <a:t>Clique para editar o formato do texto da estrutura de tópicos</a:t>
+              <a:t>Click to edit the outline text format</a:t>
             </a:r>
-            <a:endParaRPr lang="pt-BR" sz="3200" b="0" strike="noStrike" spc="-1">
+            <a:endParaRPr lang="pt-BR" sz="1800" b="0" strike="noStrike" spc="-1">
               <a:solidFill>
                 <a:srgbClr val="000000"/>
               </a:solidFill>
@@ -3290,7 +3269,7 @@
               <a:buChar char=""/>
             </a:pPr>
             <a:r>
-              <a:rPr lang="pt-BR" sz="2800" b="0" strike="noStrike" spc="-1">
+              <a:rPr lang="pt-BR" sz="1800" b="0" strike="noStrike" spc="-1">
                 <a:solidFill>
                   <a:srgbClr val="000000"/>
                 </a:solidFill>
@@ -3301,9 +3280,9 @@
                 </a:uFill>
                 <a:latin typeface="Arial" charset="0"/>
               </a:rPr>
-              <a:t>2.º nível da estrutura de tópicos</a:t>
+              <a:t>Second Outline Level</a:t>
             </a:r>
-            <a:endParaRPr lang="pt-BR" sz="2800" b="0" strike="noStrike" spc="-1">
+            <a:endParaRPr lang="pt-BR" sz="1800" b="0" strike="noStrike" spc="-1">
               <a:solidFill>
                 <a:srgbClr val="000000"/>
               </a:solidFill>
@@ -3325,7 +3304,7 @@
               <a:buChar char=""/>
             </a:pPr>
             <a:r>
-              <a:rPr lang="pt-BR" sz="2400" b="0" strike="noStrike" spc="-1">
+              <a:rPr lang="pt-BR" sz="1800" b="0" strike="noStrike" spc="-1">
                 <a:solidFill>
                   <a:srgbClr val="000000"/>
                 </a:solidFill>
@@ -3336,9 +3315,9 @@
                 </a:uFill>
                 <a:latin typeface="Arial" charset="0"/>
               </a:rPr>
-              <a:t>3.º nível da estrutura de tópicos</a:t>
+              <a:t>Third Outline Level</a:t>
             </a:r>
-            <a:endParaRPr lang="pt-BR" sz="2400" b="0" strike="noStrike" spc="-1">
+            <a:endParaRPr lang="pt-BR" sz="1800" b="0" strike="noStrike" spc="-1">
               <a:solidFill>
                 <a:srgbClr val="000000"/>
               </a:solidFill>
@@ -3360,7 +3339,7 @@
               <a:buChar char=""/>
             </a:pPr>
             <a:r>
-              <a:rPr lang="pt-BR" sz="2000" b="0" strike="noStrike" spc="-1">
+              <a:rPr lang="pt-BR" sz="1800" b="0" strike="noStrike" spc="-1">
                 <a:solidFill>
                   <a:srgbClr val="000000"/>
                 </a:solidFill>
@@ -3371,9 +3350,9 @@
                 </a:uFill>
                 <a:latin typeface="Arial" charset="0"/>
               </a:rPr>
-              <a:t>4.º nível da estrutura de tópicos</a:t>
+              <a:t>Fourth Outline Level</a:t>
             </a:r>
-            <a:endParaRPr lang="pt-BR" sz="2000" b="0" strike="noStrike" spc="-1">
+            <a:endParaRPr lang="pt-BR" sz="1800" b="0" strike="noStrike" spc="-1">
               <a:solidFill>
                 <a:srgbClr val="000000"/>
               </a:solidFill>
@@ -3406,7 +3385,7 @@
                 </a:uFill>
                 <a:latin typeface="Arial" charset="0"/>
               </a:rPr>
-              <a:t>5.º nível da estrutura de tópicos</a:t>
+              <a:t>Fifth Outline Level</a:t>
             </a:r>
             <a:endParaRPr lang="pt-BR" sz="2000" b="0" strike="noStrike" spc="-1">
               <a:solidFill>
@@ -3441,7 +3420,7 @@
                 </a:uFill>
                 <a:latin typeface="Arial" charset="0"/>
               </a:rPr>
-              <a:t>6.º nível da estrutura de tópicos</a:t>
+              <a:t>Sixth Outline Level</a:t>
             </a:r>
             <a:endParaRPr lang="pt-BR" sz="2000" b="0" strike="noStrike" spc="-1">
               <a:solidFill>
@@ -3476,7 +3455,7 @@
                 </a:uFill>
                 <a:latin typeface="Arial" charset="0"/>
               </a:rPr>
-              <a:t>7.º nível da estrutura de tópicos</a:t>
+              <a:t>Seventh Outline Level</a:t>
             </a:r>
             <a:endParaRPr lang="pt-BR" sz="2000" b="0" strike="noStrike" spc="-1">
               <a:solidFill>
@@ -3564,9 +3543,8 @@
         <p:txBody>
           <a:bodyPr lIns="0" tIns="0" rIns="0" bIns="0" anchor="ctr"/>
           <a:p>
-            <a:pPr algn="ctr"/>
             <a:r>
-              <a:rPr lang="pt-BR" sz="4400" b="0" strike="noStrike" spc="-1">
+              <a:rPr lang="pt-BR" sz="1800" b="0" strike="noStrike" spc="-1">
                 <a:solidFill>
                   <a:srgbClr val="000000"/>
                 </a:solidFill>
@@ -3577,9 +3555,9 @@
                 </a:uFill>
                 <a:latin typeface="Arial" charset="0"/>
               </a:rPr>
-              <a:t>Clique para editar o formato do texto do título</a:t>
+              <a:t>Click to edit the title text format</a:t>
             </a:r>
-            <a:endParaRPr lang="pt-BR" sz="4400" b="0" strike="noStrike" spc="-1">
+            <a:endParaRPr lang="pt-BR" sz="1800" b="0" strike="noStrike" spc="-1">
               <a:solidFill>
                 <a:srgbClr val="000000"/>
               </a:solidFill>
@@ -3624,7 +3602,7 @@
               <a:buChar char=""/>
             </a:pPr>
             <a:r>
-              <a:rPr lang="pt-BR" sz="3200" b="0" strike="noStrike" spc="-1">
+              <a:rPr lang="pt-BR" sz="1800" b="0" strike="noStrike" spc="-1">
                 <a:solidFill>
                   <a:srgbClr val="000000"/>
                 </a:solidFill>
@@ -3635,9 +3613,9 @@
                 </a:uFill>
                 <a:latin typeface="Arial" charset="0"/>
               </a:rPr>
-              <a:t>Clique para editar o formato do texto da estrutura de tópicos</a:t>
+              <a:t>Click to edit the outline text format</a:t>
             </a:r>
-            <a:endParaRPr lang="pt-BR" sz="3200" b="0" strike="noStrike" spc="-1">
+            <a:endParaRPr lang="pt-BR" sz="1800" b="0" strike="noStrike" spc="-1">
               <a:solidFill>
                 <a:srgbClr val="000000"/>
               </a:solidFill>
@@ -3659,7 +3637,7 @@
               <a:buChar char=""/>
             </a:pPr>
             <a:r>
-              <a:rPr lang="pt-BR" sz="2800" b="0" strike="noStrike" spc="-1">
+              <a:rPr lang="pt-BR" sz="1800" b="0" strike="noStrike" spc="-1">
                 <a:solidFill>
                   <a:srgbClr val="000000"/>
                 </a:solidFill>
@@ -3670,9 +3648,9 @@
                 </a:uFill>
                 <a:latin typeface="Arial" charset="0"/>
               </a:rPr>
-              <a:t>2.º nível da estrutura de tópicos</a:t>
+              <a:t>Second Outline Level</a:t>
             </a:r>
-            <a:endParaRPr lang="pt-BR" sz="2800" b="0" strike="noStrike" spc="-1">
+            <a:endParaRPr lang="pt-BR" sz="1800" b="0" strike="noStrike" spc="-1">
               <a:solidFill>
                 <a:srgbClr val="000000"/>
               </a:solidFill>
@@ -3694,7 +3672,7 @@
               <a:buChar char=""/>
             </a:pPr>
             <a:r>
-              <a:rPr lang="pt-BR" sz="2400" b="0" strike="noStrike" spc="-1">
+              <a:rPr lang="pt-BR" sz="1800" b="0" strike="noStrike" spc="-1">
                 <a:solidFill>
                   <a:srgbClr val="000000"/>
                 </a:solidFill>
@@ -3705,9 +3683,9 @@
                 </a:uFill>
                 <a:latin typeface="Arial" charset="0"/>
               </a:rPr>
-              <a:t>3.º nível da estrutura de tópicos</a:t>
+              <a:t>Third Outline Level</a:t>
             </a:r>
-            <a:endParaRPr lang="pt-BR" sz="2400" b="0" strike="noStrike" spc="-1">
+            <a:endParaRPr lang="pt-BR" sz="1800" b="0" strike="noStrike" spc="-1">
               <a:solidFill>
                 <a:srgbClr val="000000"/>
               </a:solidFill>
@@ -3729,7 +3707,7 @@
               <a:buChar char=""/>
             </a:pPr>
             <a:r>
-              <a:rPr lang="pt-BR" sz="2000" b="0" strike="noStrike" spc="-1">
+              <a:rPr lang="pt-BR" sz="1800" b="0" strike="noStrike" spc="-1">
                 <a:solidFill>
                   <a:srgbClr val="000000"/>
                 </a:solidFill>
@@ -3740,9 +3718,9 @@
                 </a:uFill>
                 <a:latin typeface="Arial" charset="0"/>
               </a:rPr>
-              <a:t>4.º nível da estrutura de tópicos</a:t>
+              <a:t>Fourth Outline Level</a:t>
             </a:r>
-            <a:endParaRPr lang="pt-BR" sz="2000" b="0" strike="noStrike" spc="-1">
+            <a:endParaRPr lang="pt-BR" sz="1800" b="0" strike="noStrike" spc="-1">
               <a:solidFill>
                 <a:srgbClr val="000000"/>
               </a:solidFill>
@@ -3775,7 +3753,7 @@
                 </a:uFill>
                 <a:latin typeface="Arial" charset="0"/>
               </a:rPr>
-              <a:t>5.º nível da estrutura de tópicos</a:t>
+              <a:t>Fifth Outline Level</a:t>
             </a:r>
             <a:endParaRPr lang="pt-BR" sz="2000" b="0" strike="noStrike" spc="-1">
               <a:solidFill>
@@ -3810,7 +3788,7 @@
                 </a:uFill>
                 <a:latin typeface="Arial" charset="0"/>
               </a:rPr>
-              <a:t>6.º nível da estrutura de tópicos</a:t>
+              <a:t>Sixth Outline Level</a:t>
             </a:r>
             <a:endParaRPr lang="pt-BR" sz="2000" b="0" strike="noStrike" spc="-1">
               <a:solidFill>
@@ -3845,7 +3823,7 @@
                 </a:uFill>
                 <a:latin typeface="Arial" charset="0"/>
               </a:rPr>
-              <a:t>7.º nível da estrutura de tópicos</a:t>
+              <a:t>Seventh Outline Level</a:t>
             </a:r>
             <a:endParaRPr lang="pt-BR" sz="2000" b="0" strike="noStrike" spc="-1">
               <a:solidFill>
@@ -3912,7 +3890,7 @@
         <p:spPr>
           <a:xfrm>
             <a:off x="685800" y="2562480"/>
-            <a:ext cx="7769520" cy="1467000"/>
+            <a:ext cx="7769160" cy="1466640"/>
           </a:xfrm>
           <a:prstGeom prst="rect">
             <a:avLst/>
@@ -4034,7 +4012,7 @@
         <p:spPr>
           <a:xfrm>
             <a:off x="3808800" y="828000"/>
-            <a:ext cx="1372680" cy="1372680"/>
+            <a:ext cx="1372320" cy="1372320"/>
           </a:xfrm>
           <a:prstGeom prst="rect">
             <a:avLst/>
@@ -4085,7 +4063,7 @@
         <p:spPr>
           <a:xfrm>
             <a:off x="457200" y="274680"/>
-            <a:ext cx="8226720" cy="1140120"/>
+            <a:ext cx="8226360" cy="1139760"/>
           </a:xfrm>
           <a:prstGeom prst="rect">
             <a:avLst/>
@@ -4159,7 +4137,7 @@
         <p:spPr>
           <a:xfrm>
             <a:off x="25200" y="1609200"/>
-            <a:ext cx="9143640" cy="5140800"/>
+            <a:ext cx="9143280" cy="5140440"/>
           </a:xfrm>
           <a:prstGeom prst="rect">
             <a:avLst/>
@@ -4210,7 +4188,7 @@
         <p:spPr>
           <a:xfrm>
             <a:off x="457200" y="274680"/>
-            <a:ext cx="8226720" cy="1140120"/>
+            <a:ext cx="8226360" cy="1139760"/>
           </a:xfrm>
           <a:prstGeom prst="rect">
             <a:avLst/>
@@ -4284,7 +4262,7 @@
         <p:spPr>
           <a:xfrm>
             <a:off x="360" y="1637640"/>
-            <a:ext cx="9143640" cy="5130360"/>
+            <a:ext cx="9143280" cy="5130000"/>
           </a:xfrm>
           <a:prstGeom prst="rect">
             <a:avLst/>
@@ -4335,7 +4313,7 @@
         <p:spPr>
           <a:xfrm>
             <a:off x="457200" y="274680"/>
-            <a:ext cx="8226720" cy="1140120"/>
+            <a:ext cx="8226360" cy="1139760"/>
           </a:xfrm>
           <a:prstGeom prst="rect">
             <a:avLst/>
@@ -4422,6 +4400,36 @@
               </a:uFill>
               <a:latin typeface="Arial" charset="0"/>
             </a:endParaRPr>
+          </a:p>
+        </p:txBody>
+      </p:sp>
+      <p:sp>
+        <p:nvSpPr>
+          <p:cNvPr id="3" name="Text Box 2"/>
+          <p:cNvSpPr txBox="1"/>
+          <p:nvPr/>
+        </p:nvSpPr>
+        <p:spPr>
+          <a:xfrm>
+            <a:off x="0" y="3429000"/>
+            <a:ext cx="9148445" cy="457200"/>
+          </a:xfrm>
+          <a:prstGeom prst="rect">
+            <a:avLst/>
+          </a:prstGeom>
+          <a:noFill/>
+        </p:spPr>
+        <p:txBody>
+          <a:bodyPr wrap="square" rtlCol="0" anchor="t">
+            <a:spAutoFit/>
+          </a:bodyPr>
+          <a:p>
+            <a:pPr algn="ctr"/>
+            <a:r>
+              <a:rPr lang="en-US" sz="2400"/>
+              <a:t>https://travis-ci.org/AjudeMais/AjudeMais/builds</a:t>
+            </a:r>
+            <a:endParaRPr lang="en-US" sz="2400"/>
           </a:p>
         </p:txBody>
       </p:sp>
@@ -4466,7 +4474,7 @@
         <p:spPr>
           <a:xfrm>
             <a:off x="457200" y="274680"/>
-            <a:ext cx="8226720" cy="1140120"/>
+            <a:ext cx="8226360" cy="1139760"/>
           </a:xfrm>
           <a:prstGeom prst="rect">
             <a:avLst/>
@@ -4540,7 +4548,7 @@
         <p:spPr>
           <a:xfrm>
             <a:off x="551880" y="1252800"/>
-            <a:ext cx="7944120" cy="5299200"/>
+            <a:ext cx="7943760" cy="5298840"/>
           </a:xfrm>
           <a:prstGeom prst="rect">
             <a:avLst/>
@@ -4591,7 +4599,7 @@
         <p:spPr>
           <a:xfrm>
             <a:off x="457200" y="274680"/>
-            <a:ext cx="8226720" cy="1140120"/>
+            <a:ext cx="8226360" cy="1139760"/>
           </a:xfrm>
           <a:prstGeom prst="rect">
             <a:avLst/>
@@ -4665,7 +4673,7 @@
         <p:spPr>
           <a:xfrm>
             <a:off x="360000" y="1224000"/>
-            <a:ext cx="8448840" cy="5305320"/>
+            <a:ext cx="8448480" cy="5304960"/>
           </a:xfrm>
           <a:prstGeom prst="rect">
             <a:avLst/>
@@ -4709,14 +4717,14 @@
       </p:grpSpPr>
       <p:sp>
         <p:nvSpPr>
-          <p:cNvPr id="102" name="CustomShape 1"/>
+          <p:cNvPr id="100" name="CustomShape 1"/>
           <p:cNvSpPr/>
           <p:nvPr/>
         </p:nvSpPr>
         <p:spPr>
           <a:xfrm>
             <a:off x="457200" y="274680"/>
-            <a:ext cx="8226720" cy="1140120"/>
+            <a:ext cx="8226360" cy="1139760"/>
           </a:xfrm>
           <a:prstGeom prst="rect">
             <a:avLst/>
@@ -4777,14 +4785,14 @@
       </p:sp>
       <p:sp>
         <p:nvSpPr>
-          <p:cNvPr id="103" name="CustomShape 2"/>
+          <p:cNvPr id="101" name="CustomShape 2"/>
           <p:cNvSpPr/>
           <p:nvPr/>
         </p:nvSpPr>
         <p:spPr>
           <a:xfrm>
             <a:off x="457200" y="1600200"/>
-            <a:ext cx="8540280" cy="4523040"/>
+            <a:ext cx="8539920" cy="4522680"/>
           </a:xfrm>
           <a:prstGeom prst="rect">
             <a:avLst/>
@@ -4815,7 +4823,7 @@
               </a:lnSpc>
             </a:pPr>
             <a:r>
-              <a:rPr lang="pt-BR" sz="2000" b="0" u="sng" strike="noStrike" spc="-1">
+              <a:rPr lang="pt-BR" sz="2800" b="0" u="sng" strike="noStrike" spc="-1">
                 <a:solidFill>
                   <a:srgbClr val="0000FF"/>
                 </a:solidFill>
@@ -4830,16 +4838,18 @@
               </a:rPr>
               <a:t>https://github.com/AjudeMais/AjudeMais/tree/development/Sistema/002-Implementacao/ajudeMais-ws</a:t>
             </a:r>
-            <a:endParaRPr lang="pt-BR" sz="1800" b="0" strike="noStrike" spc="-1">
-              <a:solidFill>
-                <a:srgbClr val="000000"/>
-              </a:solidFill>
-              <a:uFill>
-                <a:solidFill>
-                  <a:srgbClr val="FFFFFF"/>
-                </a:solidFill>
-              </a:uFill>
-              <a:latin typeface="Arial" charset="0"/>
+            <a:endParaRPr lang="pt-BR" sz="2800" b="0" u="sng" strike="noStrike" spc="-1">
+              <a:solidFill>
+                <a:srgbClr val="0000FF"/>
+              </a:solidFill>
+              <a:uFill>
+                <a:solidFill>
+                  <a:srgbClr val="FFFFFF"/>
+                </a:solidFill>
+              </a:uFill>
+              <a:latin typeface="Calibri"/>
+              <a:ea typeface="DejaVu Sans"/>
+              <a:hlinkClick r:id="rId1"/>
             </a:endParaRPr>
           </a:p>
         </p:txBody>
@@ -4878,14 +4888,14 @@
       </p:grpSpPr>
       <p:sp>
         <p:nvSpPr>
-          <p:cNvPr id="104" name="CustomShape 1"/>
+          <p:cNvPr id="102" name="CustomShape 1"/>
           <p:cNvSpPr/>
           <p:nvPr/>
         </p:nvSpPr>
         <p:spPr>
           <a:xfrm>
             <a:off x="457200" y="274680"/>
-            <a:ext cx="8226720" cy="1140120"/>
+            <a:ext cx="8226360" cy="1139760"/>
           </a:xfrm>
           <a:prstGeom prst="rect">
             <a:avLst/>
@@ -4946,14 +4956,14 @@
       </p:sp>
       <p:sp>
         <p:nvSpPr>
-          <p:cNvPr id="105" name="CustomShape 2"/>
+          <p:cNvPr id="103" name="CustomShape 2"/>
           <p:cNvSpPr/>
           <p:nvPr/>
         </p:nvSpPr>
         <p:spPr>
           <a:xfrm>
             <a:off x="457200" y="1600200"/>
-            <a:ext cx="8540280" cy="4523040"/>
+            <a:ext cx="8539920" cy="4522680"/>
           </a:xfrm>
           <a:prstGeom prst="rect">
             <a:avLst/>
@@ -4978,19 +4988,68 @@
         <p:txBody>
           <a:bodyPr lIns="90000" tIns="45000" rIns="90000" bIns="45000"/>
           <a:p>
-            <a:pPr marL="342900" indent="-340360">
+            <a:pPr marL="457200" indent="-457200">
               <a:lnSpc>
                 <a:spcPct val="100000"/>
               </a:lnSpc>
-              <a:buClr>
-                <a:srgbClr val="000000"/>
-              </a:buClr>
-              <a:buSzPct val="45000"/>
-              <a:buFont typeface="Wingdings" panose="05000000000000000000" charset="2"/>
-              <a:buChar char=""/>
+              <a:buFont typeface="Arial" charset="0"/>
+              <a:buChar char="•"/>
             </a:pPr>
             <a:r>
-              <a:rPr lang="pt-BR" sz="2000" b="0" strike="noStrike" spc="-1">
+              <a:rPr lang="x-none" altLang="pt-BR" sz="2800" b="1" spc="-1">
+                <a:solidFill>
+                  <a:srgbClr val="000000"/>
+                </a:solidFill>
+                <a:uFill>
+                  <a:solidFill>
+                    <a:srgbClr val="FFFFFF"/>
+                  </a:solidFill>
+                </a:uFill>
+                <a:latin typeface="Calibri"/>
+                <a:ea typeface="DejaVu Sans"/>
+                <a:sym typeface="+mn-ea"/>
+              </a:rPr>
+              <a:t>Mesmas lições</a:t>
+            </a:r>
+            <a:r>
+              <a:rPr lang="x-none" altLang="pt-BR" sz="2800" spc="-1">
+                <a:solidFill>
+                  <a:srgbClr val="000000"/>
+                </a:solidFill>
+                <a:uFill>
+                  <a:solidFill>
+                    <a:srgbClr val="FFFFFF"/>
+                  </a:solidFill>
+                </a:uFill>
+                <a:latin typeface="Calibri"/>
+                <a:ea typeface="DejaVu Sans"/>
+                <a:sym typeface="+mn-ea"/>
+              </a:rPr>
+              <a:t> da iteração passada;</a:t>
+            </a:r>
+            <a:endParaRPr lang="pt-BR" sz="2800" b="0" strike="noStrike" spc="-1">
+              <a:solidFill>
+                <a:srgbClr val="000000"/>
+              </a:solidFill>
+              <a:uFill>
+                <a:solidFill>
+                  <a:srgbClr val="FFFFFF"/>
+                </a:solidFill>
+              </a:uFill>
+              <a:latin typeface="Calibri"/>
+              <a:ea typeface="DejaVu Sans"/>
+            </a:endParaRPr>
+          </a:p>
+          <a:p>
+            <a:pPr marL="457200" indent="-457200">
+              <a:lnSpc>
+                <a:spcPct val="100000"/>
+              </a:lnSpc>
+              <a:buFont typeface="Arial" charset="0"/>
+              <a:buChar char="•"/>
+            </a:pPr>
+            <a:r>
+              <a:rPr lang="pt-BR" sz="2800" b="0" strike="noStrike" spc="-1">
                 <a:solidFill>
                   <a:srgbClr val="000000"/>
                 </a:solidFill>
@@ -5002,18 +5061,379 @@
                 <a:latin typeface="Calibri"/>
                 <a:ea typeface="DejaVu Sans"/>
               </a:rPr>
-              <a:t>todo</a:t>
+              <a:t>Testes manuais </a:t>
             </a:r>
-            <a:endParaRPr lang="pt-BR" sz="1800" b="0" strike="noStrike" spc="-1">
-              <a:solidFill>
-                <a:srgbClr val="000000"/>
-              </a:solidFill>
-              <a:uFill>
-                <a:solidFill>
-                  <a:srgbClr val="FFFFFF"/>
-                </a:solidFill>
-              </a:uFill>
-              <a:latin typeface="Arial" charset="0"/>
+            <a:r>
+              <a:rPr lang="pt-BR" sz="2800" b="1" strike="noStrike" spc="-1">
+                <a:solidFill>
+                  <a:srgbClr val="000000"/>
+                </a:solidFill>
+                <a:uFill>
+                  <a:solidFill>
+                    <a:srgbClr val="FFFFFF"/>
+                  </a:solidFill>
+                </a:uFill>
+                <a:latin typeface="Calibri"/>
+                <a:ea typeface="DejaVu Sans"/>
+              </a:rPr>
+              <a:t>não devem</a:t>
+            </a:r>
+            <a:r>
+              <a:rPr lang="pt-BR" sz="2800" b="0" strike="noStrike" spc="-1">
+                <a:solidFill>
+                  <a:srgbClr val="000000"/>
+                </a:solidFill>
+                <a:uFill>
+                  <a:solidFill>
+                    <a:srgbClr val="FFFFFF"/>
+                  </a:solidFill>
+                </a:uFill>
+                <a:latin typeface="Calibri"/>
+                <a:ea typeface="DejaVu Sans"/>
+              </a:rPr>
+              <a:t> ser realizados pelo</a:t>
+            </a:r>
+            <a:r>
+              <a:rPr lang="x-none" altLang="pt-BR" sz="2800" b="0" strike="noStrike" spc="-1">
+                <a:solidFill>
+                  <a:srgbClr val="000000"/>
+                </a:solidFill>
+                <a:uFill>
+                  <a:solidFill>
+                    <a:srgbClr val="FFFFFF"/>
+                  </a:solidFill>
+                </a:uFill>
+                <a:latin typeface="Calibri"/>
+                <a:ea typeface="DejaVu Sans"/>
+              </a:rPr>
+              <a:t>;</a:t>
+            </a:r>
+            <a:r>
+              <a:rPr lang="pt-BR" sz="2800" b="0" strike="noStrike" spc="-1">
+                <a:solidFill>
+                  <a:srgbClr val="000000"/>
+                </a:solidFill>
+                <a:uFill>
+                  <a:solidFill>
+                    <a:srgbClr val="FFFFFF"/>
+                  </a:solidFill>
+                </a:uFill>
+                <a:latin typeface="Calibri"/>
+                <a:ea typeface="DejaVu Sans"/>
+              </a:rPr>
+              <a:t> membro que implementou a funcionalidade</a:t>
+            </a:r>
+            <a:r>
+              <a:rPr lang="x-none" altLang="pt-BR" sz="2800" b="0" strike="noStrike" spc="-1">
+                <a:solidFill>
+                  <a:srgbClr val="000000"/>
+                </a:solidFill>
+                <a:uFill>
+                  <a:solidFill>
+                    <a:srgbClr val="FFFFFF"/>
+                  </a:solidFill>
+                </a:uFill>
+                <a:latin typeface="Calibri"/>
+                <a:ea typeface="DejaVu Sans"/>
+              </a:rPr>
+              <a:t>;</a:t>
+            </a:r>
+            <a:r>
+              <a:rPr lang="pt-BR" sz="2800" b="0" strike="noStrike" spc="-1">
+                <a:solidFill>
+                  <a:srgbClr val="000000"/>
+                </a:solidFill>
+                <a:uFill>
+                  <a:solidFill>
+                    <a:srgbClr val="FFFFFF"/>
+                  </a:solidFill>
+                </a:uFill>
+                <a:latin typeface="Calibri"/>
+                <a:ea typeface="DejaVu Sans"/>
+              </a:rPr>
+              <a:t> </a:t>
+            </a:r>
+            <a:endParaRPr lang="pt-BR" sz="2800" b="0" strike="noStrike" spc="-1">
+              <a:solidFill>
+                <a:srgbClr val="000000"/>
+              </a:solidFill>
+              <a:uFill>
+                <a:solidFill>
+                  <a:srgbClr val="FFFFFF"/>
+                </a:solidFill>
+              </a:uFill>
+              <a:latin typeface="Calibri"/>
+              <a:ea typeface="DejaVu Sans"/>
+            </a:endParaRPr>
+          </a:p>
+          <a:p>
+            <a:pPr marL="457200" indent="-457200">
+              <a:lnSpc>
+                <a:spcPct val="100000"/>
+              </a:lnSpc>
+              <a:buFont typeface="Arial" charset="0"/>
+              <a:buChar char="•"/>
+            </a:pPr>
+            <a:r>
+              <a:rPr lang="pt-BR" sz="2800" spc="-1">
+                <a:solidFill>
+                  <a:srgbClr val="000000"/>
+                </a:solidFill>
+                <a:uFill>
+                  <a:solidFill>
+                    <a:srgbClr val="FFFFFF"/>
+                  </a:solidFill>
+                </a:uFill>
+                <a:latin typeface="Calibri"/>
+                <a:ea typeface="DejaVu Sans"/>
+                <a:sym typeface="+mn-ea"/>
+              </a:rPr>
+              <a:t>Definir no </a:t>
+            </a:r>
+            <a:r>
+              <a:rPr lang="pt-BR" sz="2800" b="1" spc="-1">
+                <a:solidFill>
+                  <a:srgbClr val="000000"/>
+                </a:solidFill>
+                <a:uFill>
+                  <a:solidFill>
+                    <a:srgbClr val="FFFFFF"/>
+                  </a:solidFill>
+                </a:uFill>
+                <a:latin typeface="Calibri"/>
+                <a:ea typeface="DejaVu Sans"/>
+                <a:sym typeface="+mn-ea"/>
+              </a:rPr>
+              <a:t>planejamento</a:t>
+            </a:r>
+            <a:r>
+              <a:rPr lang="pt-BR" sz="2800" spc="-1">
+                <a:solidFill>
+                  <a:srgbClr val="000000"/>
+                </a:solidFill>
+                <a:uFill>
+                  <a:solidFill>
+                    <a:srgbClr val="FFFFFF"/>
+                  </a:solidFill>
+                </a:uFill>
+                <a:latin typeface="Calibri"/>
+                <a:ea typeface="DejaVu Sans"/>
+                <a:sym typeface="+mn-ea"/>
+              </a:rPr>
+              <a:t> o que cada membro da Equipe vai fazer durante a sprint</a:t>
+            </a:r>
+            <a:r>
+              <a:rPr lang="x-none" altLang="pt-BR" sz="2800" spc="-1">
+                <a:solidFill>
+                  <a:srgbClr val="000000"/>
+                </a:solidFill>
+                <a:uFill>
+                  <a:solidFill>
+                    <a:srgbClr val="FFFFFF"/>
+                  </a:solidFill>
+                </a:uFill>
+                <a:latin typeface="Calibri"/>
+                <a:ea typeface="DejaVu Sans"/>
+                <a:sym typeface="+mn-ea"/>
+              </a:rPr>
+              <a:t>;</a:t>
+            </a:r>
+            <a:endParaRPr lang="x-none" altLang="pt-BR" sz="2800" spc="-1">
+              <a:solidFill>
+                <a:srgbClr val="000000"/>
+              </a:solidFill>
+              <a:uFill>
+                <a:solidFill>
+                  <a:srgbClr val="FFFFFF"/>
+                </a:solidFill>
+              </a:uFill>
+              <a:latin typeface="Calibri"/>
+              <a:ea typeface="DejaVu Sans"/>
+              <a:sym typeface="+mn-ea"/>
+            </a:endParaRPr>
+          </a:p>
+          <a:p>
+            <a:pPr marL="457200" indent="-457200">
+              <a:lnSpc>
+                <a:spcPct val="100000"/>
+              </a:lnSpc>
+              <a:buFont typeface="Arial" charset="0"/>
+              <a:buChar char="•"/>
+            </a:pPr>
+            <a:r>
+              <a:rPr lang="x-none" altLang="pt-BR" sz="2800" b="0" strike="noStrike" spc="-1">
+                <a:solidFill>
+                  <a:srgbClr val="000000"/>
+                </a:solidFill>
+                <a:uFill>
+                  <a:solidFill>
+                    <a:srgbClr val="FFFFFF"/>
+                  </a:solidFill>
+                </a:uFill>
+                <a:latin typeface="Calibri"/>
+                <a:ea typeface="DejaVu Sans"/>
+                <a:sym typeface="+mn-ea"/>
+              </a:rPr>
+              <a:t>Melhorar comprometimento com a </a:t>
+            </a:r>
+            <a:r>
+              <a:rPr lang="x-none" altLang="pt-BR" sz="2800" b="1" strike="noStrike" spc="-1">
+                <a:solidFill>
+                  <a:srgbClr val="000000"/>
+                </a:solidFill>
+                <a:uFill>
+                  <a:solidFill>
+                    <a:srgbClr val="FFFFFF"/>
+                  </a:solidFill>
+                </a:uFill>
+                <a:latin typeface="Calibri"/>
+                <a:ea typeface="DejaVu Sans"/>
+                <a:sym typeface="+mn-ea"/>
+              </a:rPr>
+              <a:t>qualidade </a:t>
+            </a:r>
+            <a:r>
+              <a:rPr lang="x-none" altLang="pt-BR" sz="2800" b="0" strike="noStrike" spc="-1">
+                <a:solidFill>
+                  <a:srgbClr val="000000"/>
+                </a:solidFill>
+                <a:uFill>
+                  <a:solidFill>
+                    <a:srgbClr val="FFFFFF"/>
+                  </a:solidFill>
+                </a:uFill>
+                <a:latin typeface="Calibri"/>
+                <a:ea typeface="DejaVu Sans"/>
+                <a:sym typeface="+mn-ea"/>
+              </a:rPr>
+              <a:t>do produto;</a:t>
+            </a:r>
+            <a:endParaRPr lang="x-none" altLang="pt-BR" sz="2800" b="0" strike="noStrike" spc="-1">
+              <a:solidFill>
+                <a:srgbClr val="000000"/>
+              </a:solidFill>
+              <a:uFill>
+                <a:solidFill>
+                  <a:srgbClr val="FFFFFF"/>
+                </a:solidFill>
+              </a:uFill>
+              <a:latin typeface="Calibri"/>
+              <a:ea typeface="DejaVu Sans"/>
+              <a:sym typeface="+mn-ea"/>
+            </a:endParaRPr>
+          </a:p>
+          <a:p>
+            <a:pPr marL="457200" indent="-457200">
+              <a:lnSpc>
+                <a:spcPct val="100000"/>
+              </a:lnSpc>
+              <a:buFont typeface="Arial" charset="0"/>
+              <a:buChar char="•"/>
+            </a:pPr>
+            <a:r>
+              <a:rPr lang="x-none" altLang="pt-BR" sz="2800" b="0" strike="noStrike" spc="-1">
+                <a:solidFill>
+                  <a:srgbClr val="000000"/>
+                </a:solidFill>
+                <a:uFill>
+                  <a:solidFill>
+                    <a:srgbClr val="FFFFFF"/>
+                  </a:solidFill>
+                </a:uFill>
+                <a:latin typeface="Calibri"/>
+                <a:ea typeface="DejaVu Sans"/>
+                <a:sym typeface="+mn-ea"/>
+              </a:rPr>
+              <a:t>Manter repositório </a:t>
+            </a:r>
+            <a:r>
+              <a:rPr lang="x-none" altLang="pt-BR" sz="2800" b="1" strike="noStrike" spc="-1">
+                <a:solidFill>
+                  <a:srgbClr val="000000"/>
+                </a:solidFill>
+                <a:uFill>
+                  <a:solidFill>
+                    <a:srgbClr val="FFFFFF"/>
+                  </a:solidFill>
+                </a:uFill>
+                <a:latin typeface="Calibri"/>
+                <a:ea typeface="DejaVu Sans"/>
+                <a:sym typeface="+mn-ea"/>
+              </a:rPr>
+              <a:t>atualizado</a:t>
+            </a:r>
+            <a:r>
+              <a:rPr lang="x-none" altLang="pt-BR" sz="2800" b="0" strike="noStrike" spc="-1">
+                <a:solidFill>
+                  <a:srgbClr val="000000"/>
+                </a:solidFill>
+                <a:uFill>
+                  <a:solidFill>
+                    <a:srgbClr val="FFFFFF"/>
+                  </a:solidFill>
+                </a:uFill>
+                <a:latin typeface="Calibri"/>
+                <a:ea typeface="DejaVu Sans"/>
+                <a:sym typeface="+mn-ea"/>
+              </a:rPr>
+              <a:t>.</a:t>
+            </a:r>
+            <a:endParaRPr lang="x-none" altLang="pt-BR" sz="2800" b="0" strike="noStrike" spc="-1">
+              <a:solidFill>
+                <a:srgbClr val="000000"/>
+              </a:solidFill>
+              <a:uFill>
+                <a:solidFill>
+                  <a:srgbClr val="FFFFFF"/>
+                </a:solidFill>
+              </a:uFill>
+              <a:latin typeface="Calibri"/>
+              <a:ea typeface="DejaVu Sans"/>
+              <a:sym typeface="+mn-ea"/>
+            </a:endParaRPr>
+          </a:p>
+          <a:p>
+            <a:pPr marL="457200" indent="-457200">
+              <a:lnSpc>
+                <a:spcPct val="100000"/>
+              </a:lnSpc>
+              <a:buFont typeface="Arial" charset="0"/>
+              <a:buChar char="•"/>
+            </a:pPr>
+            <a:endParaRPr lang="x-none" altLang="pt-BR" sz="2800" b="0" strike="noStrike" spc="-1">
+              <a:solidFill>
+                <a:srgbClr val="000000"/>
+              </a:solidFill>
+              <a:uFill>
+                <a:solidFill>
+                  <a:srgbClr val="FFFFFF"/>
+                </a:solidFill>
+              </a:uFill>
+              <a:latin typeface="Calibri"/>
+              <a:ea typeface="DejaVu Sans"/>
+              <a:sym typeface="+mn-ea"/>
+            </a:endParaRPr>
+          </a:p>
+          <a:p>
+            <a:pPr marL="457200" indent="-457200">
+              <a:lnSpc>
+                <a:spcPct val="100000"/>
+              </a:lnSpc>
+              <a:buFont typeface="Arial" charset="0"/>
+              <a:buChar char="•"/>
+            </a:pPr>
+            <a:endParaRPr lang="x-none" altLang="pt-BR" sz="2800" b="0" strike="noStrike" spc="-1">
+              <a:solidFill>
+                <a:srgbClr val="000000"/>
+              </a:solidFill>
+              <a:uFill>
+                <a:solidFill>
+                  <a:srgbClr val="FFFFFF"/>
+                </a:solidFill>
+              </a:uFill>
+              <a:latin typeface="Calibri"/>
+              <a:ea typeface="DejaVu Sans"/>
+              <a:sym typeface="+mn-ea"/>
             </a:endParaRPr>
           </a:p>
         </p:txBody>
@@ -5059,7 +5479,7 @@
         <p:spPr>
           <a:xfrm>
             <a:off x="457200" y="274680"/>
-            <a:ext cx="8226720" cy="1140120"/>
+            <a:ext cx="8226360" cy="1139760"/>
           </a:xfrm>
           <a:prstGeom prst="rect">
             <a:avLst/>
@@ -5127,7 +5547,7 @@
         <p:spPr>
           <a:xfrm>
             <a:off x="457200" y="1600200"/>
-            <a:ext cx="8226720" cy="4523040"/>
+            <a:ext cx="8226360" cy="4522680"/>
           </a:xfrm>
           <a:prstGeom prst="rect">
             <a:avLst/>
@@ -5152,7 +5572,7 @@
         <p:txBody>
           <a:bodyPr lIns="90000" tIns="45000" rIns="90000" bIns="45000"/>
           <a:p>
-            <a:pPr marL="342900" indent="-340360">
+            <a:pPr marL="342900" indent="-339725">
               <a:lnSpc>
                 <a:spcPct val="100000"/>
               </a:lnSpc>
@@ -5190,7 +5610,7 @@
             </a:endParaRPr>
           </a:p>
           <a:p>
-            <a:pPr marL="342900" indent="-340360">
+            <a:pPr marL="342900" indent="-339725">
               <a:lnSpc>
                 <a:spcPct val="100000"/>
               </a:lnSpc>
@@ -5228,7 +5648,7 @@
             </a:endParaRPr>
           </a:p>
           <a:p>
-            <a:pPr marL="342900" indent="-340360">
+            <a:pPr marL="342900" indent="-339725">
               <a:lnSpc>
                 <a:spcPct val="100000"/>
               </a:lnSpc>
@@ -5266,7 +5686,7 @@
             </a:endParaRPr>
           </a:p>
           <a:p>
-            <a:pPr marL="342900" indent="-340360">
+            <a:pPr marL="342900" indent="-339725">
               <a:lnSpc>
                 <a:spcPct val="100000"/>
               </a:lnSpc>
@@ -5304,7 +5724,7 @@
             </a:endParaRPr>
           </a:p>
           <a:p>
-            <a:pPr marL="342900" indent="-340360">
+            <a:pPr marL="342900" indent="-339725">
               <a:lnSpc>
                 <a:spcPct val="100000"/>
               </a:lnSpc>
@@ -5342,7 +5762,7 @@
             </a:endParaRPr>
           </a:p>
           <a:p>
-            <a:pPr marL="342900" indent="-340360">
+            <a:pPr marL="342900" indent="-339725">
               <a:lnSpc>
                 <a:spcPct val="100000"/>
               </a:lnSpc>
@@ -5422,7 +5842,7 @@
         <p:spPr>
           <a:xfrm>
             <a:off x="457200" y="274680"/>
-            <a:ext cx="8226720" cy="1140120"/>
+            <a:ext cx="8226360" cy="1139760"/>
           </a:xfrm>
           <a:prstGeom prst="rect">
             <a:avLst/>
@@ -5490,7 +5910,7 @@
         <p:spPr>
           <a:xfrm>
             <a:off x="457200" y="1600200"/>
-            <a:ext cx="8540280" cy="4523040"/>
+            <a:ext cx="8539920" cy="4522680"/>
           </a:xfrm>
           <a:prstGeom prst="rect">
             <a:avLst/>
@@ -5515,7 +5935,7 @@
         <p:txBody>
           <a:bodyPr lIns="90000" tIns="45000" rIns="90000" bIns="45000"/>
           <a:p>
-            <a:pPr marL="459740" indent="-457200">
+            <a:pPr marL="459740" indent="-456565">
               <a:lnSpc>
                 <a:spcPct val="100000"/>
               </a:lnSpc>
@@ -5541,21 +5961,20 @@
               </a:rPr>
               <a:t>Gerenciamento de Doadores;</a:t>
             </a:r>
-            <a:endParaRPr lang="pt-BR" sz="2800" b="0" strike="noStrike" spc="-1">
-              <a:solidFill>
-                <a:srgbClr val="000000"/>
-              </a:solidFill>
-              <a:uFill>
-                <a:solidFill>
-                  <a:srgbClr val="FFFFFF"/>
-                </a:solidFill>
-              </a:uFill>
-              <a:latin typeface="Calibri"/>
-              <a:ea typeface="DejaVu Sans"/>
-            </a:endParaRPr>
-          </a:p>
-          <a:p>
-            <a:pPr marL="459740" indent="-457200">
+            <a:endParaRPr lang="pt-BR" sz="1800" b="0" strike="noStrike" spc="-1">
+              <a:solidFill>
+                <a:srgbClr val="000000"/>
+              </a:solidFill>
+              <a:uFill>
+                <a:solidFill>
+                  <a:srgbClr val="FFFFFF"/>
+                </a:solidFill>
+              </a:uFill>
+              <a:latin typeface="Arial" charset="0"/>
+            </a:endParaRPr>
+          </a:p>
+          <a:p>
+            <a:pPr marL="459740" indent="-456565">
               <a:lnSpc>
                 <a:spcPct val="100000"/>
               </a:lnSpc>
@@ -5636,7 +6055,7 @@
         <p:spPr>
           <a:xfrm>
             <a:off x="457200" y="274680"/>
-            <a:ext cx="8226720" cy="1140120"/>
+            <a:ext cx="8226360" cy="1139760"/>
           </a:xfrm>
           <a:prstGeom prst="rect">
             <a:avLst/>
@@ -5704,7 +6123,7 @@
         <p:spPr>
           <a:xfrm>
             <a:off x="457200" y="1600200"/>
-            <a:ext cx="8540280" cy="4523040"/>
+            <a:ext cx="8539920" cy="4522680"/>
           </a:xfrm>
           <a:prstGeom prst="rect">
             <a:avLst/>
@@ -5729,7 +6148,7 @@
         <p:txBody>
           <a:bodyPr lIns="90000" tIns="45000" rIns="90000" bIns="45000"/>
           <a:p>
-            <a:pPr marL="459740" indent="-457200">
+            <a:pPr marL="459740" indent="-456565">
               <a:lnSpc>
                 <a:spcPct val="100000"/>
               </a:lnSpc>
@@ -5768,7 +6187,7 @@
             </a:endParaRPr>
           </a:p>
           <a:p>
-            <a:pPr marL="459740" indent="-457200">
+            <a:pPr marL="459740" indent="-456565">
               <a:lnSpc>
                 <a:spcPct val="100000"/>
               </a:lnSpc>
@@ -5807,16 +6226,10 @@
             </a:endParaRPr>
           </a:p>
           <a:p>
-            <a:pPr marL="2540" indent="0">
+            <a:pPr marL="2540">
               <a:lnSpc>
                 <a:spcPct val="100000"/>
               </a:lnSpc>
-              <a:buClr>
-                <a:srgbClr val="000000"/>
-              </a:buClr>
-              <a:buSzPct val="45000"/>
-              <a:buFont typeface="Wingdings" panose="05000000000000000000" charset="2"/>
-              <a:buNone/>
             </a:pPr>
             <a:r>
               <a:rPr lang="pt-BR" sz="3200" b="0" strike="noStrike" spc="-1">
@@ -5888,7 +6301,7 @@
         <p:spPr>
           <a:xfrm>
             <a:off x="457200" y="274680"/>
-            <a:ext cx="8226720" cy="1140120"/>
+            <a:ext cx="8226360" cy="1139760"/>
           </a:xfrm>
           <a:prstGeom prst="rect">
             <a:avLst/>
@@ -5956,7 +6369,7 @@
         <p:spPr>
           <a:xfrm>
             <a:off x="457200" y="1600200"/>
-            <a:ext cx="8540280" cy="4523040"/>
+            <a:ext cx="8539920" cy="4522680"/>
           </a:xfrm>
           <a:prstGeom prst="rect">
             <a:avLst/>
@@ -5981,7 +6394,7 @@
         <p:txBody>
           <a:bodyPr lIns="90000" tIns="45000" rIns="90000" bIns="45000"/>
           <a:p>
-            <a:pPr marL="459740" indent="-457200">
+            <a:pPr marL="459740" indent="-456565">
               <a:lnSpc>
                 <a:spcPct val="100000"/>
               </a:lnSpc>
@@ -6007,21 +6420,20 @@
               </a:rPr>
               <a:t>Gerenciamento de Doadores;</a:t>
             </a:r>
-            <a:endParaRPr lang="pt-BR" sz="2800" b="0" strike="noStrike" spc="-1">
-              <a:solidFill>
-                <a:srgbClr val="000000"/>
-              </a:solidFill>
-              <a:uFill>
-                <a:solidFill>
-                  <a:srgbClr val="FFFFFF"/>
-                </a:solidFill>
-              </a:uFill>
-              <a:latin typeface="Calibri"/>
-              <a:ea typeface="DejaVu Sans"/>
-            </a:endParaRPr>
-          </a:p>
-          <a:p>
-            <a:pPr marL="459740" indent="-457200">
+            <a:endParaRPr lang="pt-BR" sz="1800" b="0" strike="noStrike" spc="-1">
+              <a:solidFill>
+                <a:srgbClr val="000000"/>
+              </a:solidFill>
+              <a:uFill>
+                <a:solidFill>
+                  <a:srgbClr val="FFFFFF"/>
+                </a:solidFill>
+              </a:uFill>
+              <a:latin typeface="Arial" charset="0"/>
+            </a:endParaRPr>
+          </a:p>
+          <a:p>
+            <a:pPr marL="459740" indent="-456565">
               <a:lnSpc>
                 <a:spcPct val="100000"/>
               </a:lnSpc>
@@ -6060,16 +6472,10 @@
             </a:endParaRPr>
           </a:p>
           <a:p>
-            <a:pPr marL="2540" indent="0">
+            <a:pPr marL="2540">
               <a:lnSpc>
                 <a:spcPct val="100000"/>
               </a:lnSpc>
-              <a:buClr>
-                <a:srgbClr val="000000"/>
-              </a:buClr>
-              <a:buSzPct val="45000"/>
-              <a:buFont typeface="Wingdings" panose="05000000000000000000" charset="2"/>
-              <a:buNone/>
             </a:pPr>
             <a:endParaRPr lang="pt-BR" sz="1800" b="0" strike="noStrike" spc="-1">
               <a:solidFill>
@@ -6126,7 +6532,7 @@
         <p:spPr>
           <a:xfrm>
             <a:off x="457200" y="274680"/>
-            <a:ext cx="8226720" cy="1140120"/>
+            <a:ext cx="8226360" cy="1139760"/>
           </a:xfrm>
           <a:prstGeom prst="rect">
             <a:avLst/>
@@ -6194,7 +6600,7 @@
         <p:spPr>
           <a:xfrm>
             <a:off x="457200" y="1600200"/>
-            <a:ext cx="8540280" cy="4523040"/>
+            <a:ext cx="8539920" cy="4522680"/>
           </a:xfrm>
           <a:prstGeom prst="rect">
             <a:avLst/>
@@ -6219,7 +6625,7 @@
         <p:txBody>
           <a:bodyPr lIns="90000" tIns="45000" rIns="90000" bIns="45000"/>
           <a:p>
-            <a:pPr marL="342900" indent="-340360">
+            <a:pPr marL="342900" indent="-339725">
               <a:lnSpc>
                 <a:spcPct val="100000"/>
               </a:lnSpc>
@@ -6336,7 +6742,7 @@
         <p:spPr>
           <a:xfrm>
             <a:off x="457200" y="274680"/>
-            <a:ext cx="8226720" cy="1140120"/>
+            <a:ext cx="8226360" cy="1139760"/>
           </a:xfrm>
           <a:prstGeom prst="rect">
             <a:avLst/>
@@ -6410,7 +6816,7 @@
         <p:spPr>
           <a:xfrm>
             <a:off x="25200" y="2073600"/>
-            <a:ext cx="9143640" cy="2733120"/>
+            <a:ext cx="9143280" cy="2732760"/>
           </a:xfrm>
           <a:prstGeom prst="rect">
             <a:avLst/>
@@ -6461,7 +6867,7 @@
         <p:spPr>
           <a:xfrm>
             <a:off x="457200" y="274680"/>
-            <a:ext cx="8226720" cy="1140120"/>
+            <a:ext cx="8226360" cy="1139760"/>
           </a:xfrm>
           <a:prstGeom prst="rect">
             <a:avLst/>
@@ -6535,7 +6941,7 @@
         <p:spPr>
           <a:xfrm>
             <a:off x="119160" y="1361520"/>
-            <a:ext cx="8952840" cy="4247640"/>
+            <a:ext cx="8952480" cy="4247280"/>
           </a:xfrm>
           <a:prstGeom prst="rect">
             <a:avLst/>
@@ -6579,14 +6985,14 @@
       </p:grpSpPr>
       <p:sp>
         <p:nvSpPr>
-          <p:cNvPr id="89" name="CustomShape 2"/>
+          <p:cNvPr id="88" name="CustomShape 1"/>
           <p:cNvSpPr/>
           <p:nvPr/>
         </p:nvSpPr>
         <p:spPr>
           <a:xfrm>
             <a:off x="457200" y="1600200"/>
-            <a:ext cx="8540280" cy="4523040"/>
+            <a:ext cx="8539920" cy="4522680"/>
           </a:xfrm>
           <a:prstGeom prst="rect">
             <a:avLst/>
@@ -6611,7 +7017,7 @@
         <p:txBody>
           <a:bodyPr lIns="90000" tIns="45000" rIns="90000" bIns="45000"/>
           <a:p>
-            <a:pPr marL="342900" indent="-340360">
+            <a:pPr marL="342900" indent="-339725">
               <a:lnSpc>
                 <a:spcPct val="100000"/>
               </a:lnSpc>
@@ -6689,7 +7095,7 @@
       </p:sp>
       <p:pic>
         <p:nvPicPr>
-          <p:cNvPr id="90" name="Picture 89"/>
+          <p:cNvPr id="89" name="Picture 89"/>
           <p:cNvPicPr/>
           <p:nvPr/>
         </p:nvPicPr>
@@ -6702,7 +7108,7 @@
         <p:spPr>
           <a:xfrm>
             <a:off x="690480" y="1224000"/>
-            <a:ext cx="7661520" cy="5421960"/>
+            <a:ext cx="7661160" cy="5421600"/>
           </a:xfrm>
           <a:prstGeom prst="rect">
             <a:avLst/>
@@ -6714,14 +7120,14 @@
       </p:pic>
       <p:sp>
         <p:nvSpPr>
-          <p:cNvPr id="93" name="CustomShape 1"/>
+          <p:cNvPr id="90" name="CustomShape 2"/>
           <p:cNvSpPr/>
           <p:nvPr/>
         </p:nvSpPr>
         <p:spPr>
           <a:xfrm>
             <a:off x="457200" y="274680"/>
-            <a:ext cx="8226720" cy="1140120"/>
+            <a:ext cx="8226360" cy="1139760"/>
           </a:xfrm>
           <a:prstGeom prst="rect">
             <a:avLst/>
@@ -6764,37 +7170,7 @@
                 <a:latin typeface="Calibri"/>
                 <a:ea typeface="DejaVu Sans"/>
               </a:rPr>
-              <a:t>Métricas - </a:t>
-            </a:r>
-            <a:r>
-              <a:rPr lang="x-none" altLang="pt-BR" sz="3200" b="0" strike="noStrike" spc="-1">
-                <a:solidFill>
-                  <a:srgbClr val="000000"/>
-                </a:solidFill>
-                <a:uFill>
-                  <a:solidFill>
-                    <a:srgbClr val="FFFFFF"/>
-                  </a:solidFill>
-                </a:uFill>
-                <a:latin typeface="Calibri"/>
-                <a:ea typeface="DejaVu Sans"/>
-              </a:rPr>
-              <a:t>Issues registradas na iteração</a:t>
-            </a:r>
-            <a:r>
-              <a:rPr lang="pt-BR" sz="3200" b="0" strike="noStrike" spc="-1">
-                <a:solidFill>
-                  <a:srgbClr val="000000"/>
-                </a:solidFill>
-                <a:uFill>
-                  <a:solidFill>
-                    <a:srgbClr val="FFFFFF"/>
-                  </a:solidFill>
-                </a:uFill>
-                <a:latin typeface="Calibri"/>
-                <a:ea typeface="DejaVu Sans"/>
-              </a:rPr>
-              <a:t>  </a:t>
+              <a:t>Métricas - Issues registradas na iteração  </a:t>
             </a:r>
             <a:endParaRPr lang="pt-BR" sz="1800" b="0" strike="noStrike" spc="-1">
               <a:solidFill>

</xml_diff>